<commit_message>
Presentatie BUO vergadering beide versies
</commit_message>
<xml_diff>
--- a/Documenten/BUO vergadering presentation.pptx
+++ b/Documenten/BUO vergadering presentation.pptx
@@ -11298,7 +11298,6 @@
               <a:rPr lang="en-US" dirty="0" smtClean="0"/>
               <a:t>Mike Mol</a:t>
             </a:r>
-            <a:endParaRPr lang="en-US" dirty="0" smtClean="0"/>
           </a:p>
         </p:txBody>
       </p:sp>
@@ -11400,7 +11399,6 @@
               <a:rPr lang="en-US" dirty="0" smtClean="0"/>
               <a:t>Demo</a:t>
             </a:r>
-            <a:endParaRPr lang="en-US" dirty="0" smtClean="0"/>
           </a:p>
         </p:txBody>
       </p:sp>
@@ -11667,7 +11665,6 @@
               <a:rPr lang="en-US" dirty="0" smtClean="0"/>
               <a:t>De Scanner Glassware</a:t>
             </a:r>
-            <a:endParaRPr lang="en-US" dirty="0" smtClean="0"/>
           </a:p>
         </p:txBody>
       </p:sp>
@@ -11834,8 +11831,12 @@
           <a:lstStyle/>
           <a:p>
             <a:r>
+              <a:rPr lang="en-US" dirty="0" err="1" smtClean="0"/>
+              <a:t>Applicatie</a:t>
+            </a:r>
+            <a:r>
               <a:rPr lang="en-US" dirty="0" smtClean="0"/>
-              <a:t>Demo</a:t>
+              <a:t> flow</a:t>
             </a:r>
             <a:endParaRPr lang="en-US" dirty="0" smtClean="0"/>
           </a:p>
@@ -11902,45 +11903,33 @@
       </p:sp>
       <p:pic>
         <p:nvPicPr>
-          <p:cNvPr id="1026" name="Picture 2" descr="http://midches.com/images/uploads/default/demo.jpg"/>
+          <p:cNvPr id="3" name="Content Placeholder 2">
+            <a:hlinkClick r:id="rId3" action="ppaction://hlinkfile"/>
+          </p:cNvPr>
           <p:cNvPicPr>
-            <a:picLocks noGrp="1" noChangeAspect="1" noChangeArrowheads="1"/>
+            <a:picLocks noGrp="1" noChangeAspect="1"/>
           </p:cNvPicPr>
           <p:nvPr>
             <p:ph idx="1"/>
           </p:nvPr>
         </p:nvPicPr>
         <p:blipFill>
-          <a:blip r:embed="rId3">
+          <a:blip r:embed="rId4">
             <a:extLst>
               <a:ext uri="{28A0092B-C50C-407E-A947-70E740481C1C}">
                 <a14:useLocalDpi xmlns:a14="http://schemas.microsoft.com/office/drawing/2010/main" val="0"/>
               </a:ext>
             </a:extLst>
           </a:blip>
-          <a:srcRect/>
           <a:stretch>
             <a:fillRect/>
           </a:stretch>
         </p:blipFill>
-        <p:spPr bwMode="auto">
+        <p:spPr>
           <a:xfrm>
-            <a:off x="2676525" y="1251744"/>
-            <a:ext cx="3790950" cy="2733675"/>
+            <a:off x="3862795" y="642938"/>
+            <a:ext cx="1418410" cy="3951287"/>
           </a:xfrm>
-          <a:prstGeom prst="rect">
-            <a:avLst/>
-          </a:prstGeom>
-          <a:noFill/>
-          <a:extLst>
-            <a:ext uri="{909E8E84-426E-40DD-AFC4-6F175D3DCCD1}">
-              <a14:hiddenFill xmlns:a14="http://schemas.microsoft.com/office/drawing/2010/main">
-                <a:solidFill>
-                  <a:srgbClr val="FFFFFF"/>
-                </a:solidFill>
-              </a14:hiddenFill>
-            </a:ext>
-          </a:extLst>
         </p:spPr>
       </p:pic>
     </p:spTree>
@@ -13106,19 +13095,14 @@
 </file>
 
 <file path=customXml/item1.xml><?xml version="1.0" encoding="utf-8"?>
-<?mso-contentType ?>
-<FormTemplates xmlns="http://schemas.microsoft.com/sharepoint/v3/contenttype/forms">
-  <Display>DocumentLibraryForm</Display>
-  <Edit>DocumentLibraryForm</Edit>
-  <New>DocumentLibraryForm</New>
-</FormTemplates>
+<p:properties xmlns:p="http://schemas.microsoft.com/office/2006/metadata/properties" xmlns:xsi="http://www.w3.org/2001/XMLSchema-instance">
+  <documentManagement>
+    <Omschrijving xmlns="f9a150b1-3ba2-4988-8a7d-e3cfa780e8d5">Info Support BUO vergadering presentatie over de Google Glass</Omschrijving>
+  </documentManagement>
+</p:properties>
 </file>
 
 <file path=customXml/item2.xml><?xml version="1.0" encoding="utf-8"?>
-<LongProperties xmlns="http://schemas.microsoft.com/office/2006/metadata/longProperties"/>
-</file>
-
-<file path=customXml/item3.xml><?xml version="1.0" encoding="utf-8"?>
 <ct:contentTypeSchema xmlns:ct="http://schemas.microsoft.com/office/2006/metadata/contentType" xmlns:ma="http://schemas.microsoft.com/office/2006/metadata/properties/metaAttributes" ct:_="" ma:_="" ma:contentTypeName="Document" ma:contentTypeID="0x010100EE661F05C9A26C479912894FEB5EC1B1" ma:contentTypeVersion="1" ma:contentTypeDescription="Een nieuw document maken." ma:contentTypeScope="" ma:versionID="2a05dece8e3bd3c33f75976138b7081c">
   <xsd:schema xmlns:xsd="http://www.w3.org/2001/XMLSchema" xmlns:p="http://schemas.microsoft.com/office/2006/metadata/properties" xmlns:ns2="f9a150b1-3ba2-4988-8a7d-e3cfa780e8d5" targetNamespace="http://schemas.microsoft.com/office/2006/metadata/properties" ma:root="true" ma:fieldsID="c8938326b7293ea2ee7fa2cce6e49576" ns2:_="">
     <xsd:import namespace="f9a150b1-3ba2-4988-8a7d-e3cfa780e8d5"/>
@@ -13180,31 +13164,35 @@
 </ct:contentTypeSchema>
 </file>
 
+<file path=customXml/item3.xml><?xml version="1.0" encoding="utf-8"?>
+<LongProperties xmlns="http://schemas.microsoft.com/office/2006/metadata/longProperties"/>
+</file>
+
 <file path=customXml/item4.xml><?xml version="1.0" encoding="utf-8"?>
-<p:properties xmlns:p="http://schemas.microsoft.com/office/2006/metadata/properties" xmlns:xsi="http://www.w3.org/2001/XMLSchema-instance">
-  <documentManagement>
-    <Omschrijving xmlns="f9a150b1-3ba2-4988-8a7d-e3cfa780e8d5">Info Support BUO vergadering presentatie over de Google Glass</Omschrijving>
-  </documentManagement>
-</p:properties>
+<?mso-contentType ?>
+<FormTemplates xmlns="http://schemas.microsoft.com/sharepoint/v3/contenttype/forms">
+  <Display>DocumentLibraryForm</Display>
+  <Edit>DocumentLibraryForm</Edit>
+  <New>DocumentLibraryForm</New>
+</FormTemplates>
 </file>
 
 <file path=customXml/itemProps1.xml><?xml version="1.0" encoding="utf-8"?>
-<ds:datastoreItem xmlns:ds="http://schemas.openxmlformats.org/officeDocument/2006/customXml" ds:itemID="{C7B310DF-605C-48D1-8C27-6CBCC2B3E03A}">
+<ds:datastoreItem xmlns:ds="http://schemas.openxmlformats.org/officeDocument/2006/customXml" ds:itemID="{4A988EEA-97E6-4944-AFE5-3E58A9F7677C}">
   <ds:schemaRefs>
-    <ds:schemaRef ds:uri="http://schemas.microsoft.com/sharepoint/v3/contenttype/forms"/>
+    <ds:schemaRef ds:uri="http://schemas.microsoft.com/office/2006/documentManagement/types"/>
+    <ds:schemaRef ds:uri="http://purl.org/dc/elements/1.1/"/>
+    <ds:schemaRef ds:uri="http://schemas.microsoft.com/office/2006/metadata/properties"/>
+    <ds:schemaRef ds:uri="http://purl.org/dc/terms/"/>
+    <ds:schemaRef ds:uri="http://schemas.openxmlformats.org/package/2006/metadata/core-properties"/>
+    <ds:schemaRef ds:uri="f9a150b1-3ba2-4988-8a7d-e3cfa780e8d5"/>
+    <ds:schemaRef ds:uri="http://www.w3.org/XML/1998/namespace"/>
+    <ds:schemaRef ds:uri="http://purl.org/dc/dcmitype/"/>
   </ds:schemaRefs>
 </ds:datastoreItem>
 </file>
 
 <file path=customXml/itemProps2.xml><?xml version="1.0" encoding="utf-8"?>
-<ds:datastoreItem xmlns:ds="http://schemas.openxmlformats.org/officeDocument/2006/customXml" ds:itemID="{BB307D93-2FFF-4F8B-9E81-F7ACFE01FC73}">
-  <ds:schemaRefs>
-    <ds:schemaRef ds:uri="http://schemas.microsoft.com/office/2006/metadata/longProperties"/>
-  </ds:schemaRefs>
-</ds:datastoreItem>
-</file>
-
-<file path=customXml/itemProps3.xml><?xml version="1.0" encoding="utf-8"?>
 <ds:datastoreItem xmlns:ds="http://schemas.openxmlformats.org/officeDocument/2006/customXml" ds:itemID="{47D3FC6E-852F-457D-810F-BE827CBFC425}">
   <ds:schemaRefs>
     <ds:schemaRef ds:uri="http://schemas.microsoft.com/office/2006/metadata/contentType"/>
@@ -13221,17 +13209,18 @@
 </ds:datastoreItem>
 </file>
 
+<file path=customXml/itemProps3.xml><?xml version="1.0" encoding="utf-8"?>
+<ds:datastoreItem xmlns:ds="http://schemas.openxmlformats.org/officeDocument/2006/customXml" ds:itemID="{BB307D93-2FFF-4F8B-9E81-F7ACFE01FC73}">
+  <ds:schemaRefs>
+    <ds:schemaRef ds:uri="http://schemas.microsoft.com/office/2006/metadata/longProperties"/>
+  </ds:schemaRefs>
+</ds:datastoreItem>
+</file>
+
 <file path=customXml/itemProps4.xml><?xml version="1.0" encoding="utf-8"?>
-<ds:datastoreItem xmlns:ds="http://schemas.openxmlformats.org/officeDocument/2006/customXml" ds:itemID="{4A988EEA-97E6-4944-AFE5-3E58A9F7677C}">
+<ds:datastoreItem xmlns:ds="http://schemas.openxmlformats.org/officeDocument/2006/customXml" ds:itemID="{C7B310DF-605C-48D1-8C27-6CBCC2B3E03A}">
   <ds:schemaRefs>
-    <ds:schemaRef ds:uri="http://schemas.openxmlformats.org/package/2006/metadata/core-properties"/>
-    <ds:schemaRef ds:uri="http://purl.org/dc/terms/"/>
-    <ds:schemaRef ds:uri="http://schemas.microsoft.com/office/2006/documentManagement/types"/>
-    <ds:schemaRef ds:uri="http://purl.org/dc/elements/1.1/"/>
-    <ds:schemaRef ds:uri="http://schemas.microsoft.com/office/2006/metadata/properties"/>
-    <ds:schemaRef ds:uri="f9a150b1-3ba2-4988-8a7d-e3cfa780e8d5"/>
-    <ds:schemaRef ds:uri="http://www.w3.org/XML/1998/namespace"/>
-    <ds:schemaRef ds:uri="http://purl.org/dc/dcmitype/"/>
+    <ds:schemaRef ds:uri="http://schemas.microsoft.com/sharepoint/v3/contenttype/forms"/>
   </ds:schemaRefs>
 </ds:datastoreItem>
 </file>
</xml_diff>